<commit_message>
modification de model relationnel
</commit_message>
<xml_diff>
--- a/Model relationel.pptx
+++ b/Model relationel.pptx
@@ -272,7 +272,7 @@
           <a:p>
             <a:fld id="{AA0EC33C-8052-4438-BBBB-E20114770CFD}" type="datetimeFigureOut">
               <a:rPr lang="fr-SN" smtClean="0"/>
-              <a:t>25/10/2024</a:t>
+              <a:t>28/10/2024</a:t>
             </a:fld>
             <a:endParaRPr lang="fr-SN"/>
           </a:p>
@@ -472,7 +472,7 @@
           <a:p>
             <a:fld id="{AA0EC33C-8052-4438-BBBB-E20114770CFD}" type="datetimeFigureOut">
               <a:rPr lang="fr-SN" smtClean="0"/>
-              <a:t>25/10/2024</a:t>
+              <a:t>28/10/2024</a:t>
             </a:fld>
             <a:endParaRPr lang="fr-SN"/>
           </a:p>
@@ -682,7 +682,7 @@
           <a:p>
             <a:fld id="{AA0EC33C-8052-4438-BBBB-E20114770CFD}" type="datetimeFigureOut">
               <a:rPr lang="fr-SN" smtClean="0"/>
-              <a:t>25/10/2024</a:t>
+              <a:t>28/10/2024</a:t>
             </a:fld>
             <a:endParaRPr lang="fr-SN"/>
           </a:p>
@@ -882,7 +882,7 @@
           <a:p>
             <a:fld id="{AA0EC33C-8052-4438-BBBB-E20114770CFD}" type="datetimeFigureOut">
               <a:rPr lang="fr-SN" smtClean="0"/>
-              <a:t>25/10/2024</a:t>
+              <a:t>28/10/2024</a:t>
             </a:fld>
             <a:endParaRPr lang="fr-SN"/>
           </a:p>
@@ -1158,7 +1158,7 @@
           <a:p>
             <a:fld id="{AA0EC33C-8052-4438-BBBB-E20114770CFD}" type="datetimeFigureOut">
               <a:rPr lang="fr-SN" smtClean="0"/>
-              <a:t>25/10/2024</a:t>
+              <a:t>28/10/2024</a:t>
             </a:fld>
             <a:endParaRPr lang="fr-SN"/>
           </a:p>
@@ -1426,7 +1426,7 @@
           <a:p>
             <a:fld id="{AA0EC33C-8052-4438-BBBB-E20114770CFD}" type="datetimeFigureOut">
               <a:rPr lang="fr-SN" smtClean="0"/>
-              <a:t>25/10/2024</a:t>
+              <a:t>28/10/2024</a:t>
             </a:fld>
             <a:endParaRPr lang="fr-SN"/>
           </a:p>
@@ -1841,7 +1841,7 @@
           <a:p>
             <a:fld id="{AA0EC33C-8052-4438-BBBB-E20114770CFD}" type="datetimeFigureOut">
               <a:rPr lang="fr-SN" smtClean="0"/>
-              <a:t>25/10/2024</a:t>
+              <a:t>28/10/2024</a:t>
             </a:fld>
             <a:endParaRPr lang="fr-SN"/>
           </a:p>
@@ -1983,7 +1983,7 @@
           <a:p>
             <a:fld id="{AA0EC33C-8052-4438-BBBB-E20114770CFD}" type="datetimeFigureOut">
               <a:rPr lang="fr-SN" smtClean="0"/>
-              <a:t>25/10/2024</a:t>
+              <a:t>28/10/2024</a:t>
             </a:fld>
             <a:endParaRPr lang="fr-SN"/>
           </a:p>
@@ -2096,7 +2096,7 @@
           <a:p>
             <a:fld id="{AA0EC33C-8052-4438-BBBB-E20114770CFD}" type="datetimeFigureOut">
               <a:rPr lang="fr-SN" smtClean="0"/>
-              <a:t>25/10/2024</a:t>
+              <a:t>28/10/2024</a:t>
             </a:fld>
             <a:endParaRPr lang="fr-SN"/>
           </a:p>
@@ -2409,7 +2409,7 @@
           <a:p>
             <a:fld id="{AA0EC33C-8052-4438-BBBB-E20114770CFD}" type="datetimeFigureOut">
               <a:rPr lang="fr-SN" smtClean="0"/>
-              <a:t>25/10/2024</a:t>
+              <a:t>28/10/2024</a:t>
             </a:fld>
             <a:endParaRPr lang="fr-SN"/>
           </a:p>
@@ -2698,7 +2698,7 @@
           <a:p>
             <a:fld id="{AA0EC33C-8052-4438-BBBB-E20114770CFD}" type="datetimeFigureOut">
               <a:rPr lang="fr-SN" smtClean="0"/>
-              <a:t>25/10/2024</a:t>
+              <a:t>28/10/2024</a:t>
             </a:fld>
             <a:endParaRPr lang="fr-SN"/>
           </a:p>
@@ -2941,7 +2941,7 @@
           <a:p>
             <a:fld id="{AA0EC33C-8052-4438-BBBB-E20114770CFD}" type="datetimeFigureOut">
               <a:rPr lang="fr-SN" smtClean="0"/>
-              <a:t>25/10/2024</a:t>
+              <a:t>28/10/2024</a:t>
             </a:fld>
             <a:endParaRPr lang="fr-SN"/>
           </a:p>
@@ -3426,7 +3426,23 @@
                 <a:latin typeface="Times New Roman" panose="02020603050405020304" pitchFamily="18" charset="0"/>
                 <a:cs typeface="Times New Roman" panose="02020603050405020304" pitchFamily="18" charset="0"/>
               </a:rPr>
-              <a:t>, </a:t>
+              <a:t>)</a:t>
+            </a:r>
+          </a:p>
+          <a:p>
+            <a:r>
+              <a:rPr lang="fr-SN" sz="2400" b="1" dirty="0">
+                <a:latin typeface="Times New Roman" panose="02020603050405020304" pitchFamily="18" charset="0"/>
+                <a:cs typeface="Times New Roman" panose="02020603050405020304" pitchFamily="18" charset="0"/>
+              </a:rPr>
+              <a:t>Supplier</a:t>
+            </a:r>
+            <a:r>
+              <a:rPr lang="fr-SN" sz="2400" dirty="0">
+                <a:latin typeface="Times New Roman" panose="02020603050405020304" pitchFamily="18" charset="0"/>
+                <a:cs typeface="Times New Roman" panose="02020603050405020304" pitchFamily="18" charset="0"/>
+              </a:rPr>
+              <a:t>(</a:t>
             </a:r>
             <a:r>
               <a:rPr lang="fr-SN" sz="2400" dirty="0" err="1">
@@ -3442,6 +3458,126 @@
               </a:rPr>
               <a:t>)</a:t>
             </a:r>
+            <a:endParaRPr lang="fr-SN" sz="2400" b="1" dirty="0">
+              <a:latin typeface="Times New Roman" panose="02020603050405020304" pitchFamily="18" charset="0"/>
+              <a:cs typeface="Times New Roman" panose="02020603050405020304" pitchFamily="18" charset="0"/>
+            </a:endParaRPr>
+          </a:p>
+          <a:p>
+            <a:r>
+              <a:rPr lang="fr-SN" sz="2400" b="1" dirty="0">
+                <a:latin typeface="Times New Roman" panose="02020603050405020304" pitchFamily="18" charset="0"/>
+                <a:cs typeface="Times New Roman" panose="02020603050405020304" pitchFamily="18" charset="0"/>
+              </a:rPr>
+              <a:t>Product</a:t>
+            </a:r>
+            <a:r>
+              <a:rPr lang="fr-SN" sz="2400" dirty="0">
+                <a:latin typeface="Times New Roman" panose="02020603050405020304" pitchFamily="18" charset="0"/>
+                <a:cs typeface="Times New Roman" panose="02020603050405020304" pitchFamily="18" charset="0"/>
+              </a:rPr>
+              <a:t>(</a:t>
+            </a:r>
+            <a:r>
+              <a:rPr lang="fr-SN" sz="2400" dirty="0" err="1">
+                <a:latin typeface="Times New Roman" panose="02020603050405020304" pitchFamily="18" charset="0"/>
+                <a:cs typeface="Times New Roman" panose="02020603050405020304" pitchFamily="18" charset="0"/>
+              </a:rPr>
+              <a:t>ProductId</a:t>
+            </a:r>
+            <a:r>
+              <a:rPr lang="fr-SN" sz="2400" dirty="0">
+                <a:latin typeface="Times New Roman" panose="02020603050405020304" pitchFamily="18" charset="0"/>
+                <a:cs typeface="Times New Roman" panose="02020603050405020304" pitchFamily="18" charset="0"/>
+              </a:rPr>
+              <a:t>)</a:t>
+            </a:r>
+          </a:p>
+          <a:p>
+            <a:r>
+              <a:rPr lang="fr-SN" sz="2400" b="1" dirty="0" err="1">
+                <a:latin typeface="Times New Roman" panose="02020603050405020304" pitchFamily="18" charset="0"/>
+                <a:cs typeface="Times New Roman" panose="02020603050405020304" pitchFamily="18" charset="0"/>
+              </a:rPr>
+              <a:t>Order</a:t>
+            </a:r>
+            <a:r>
+              <a:rPr lang="fr-SN" sz="2400" dirty="0">
+                <a:latin typeface="Times New Roman" panose="02020603050405020304" pitchFamily="18" charset="0"/>
+                <a:cs typeface="Times New Roman" panose="02020603050405020304" pitchFamily="18" charset="0"/>
+              </a:rPr>
+              <a:t>(</a:t>
+            </a:r>
+            <a:r>
+              <a:rPr lang="fr-SN" sz="2400" dirty="0" err="1">
+                <a:latin typeface="Times New Roman" panose="02020603050405020304" pitchFamily="18" charset="0"/>
+                <a:cs typeface="Times New Roman" panose="02020603050405020304" pitchFamily="18" charset="0"/>
+              </a:rPr>
+              <a:t>OrderId</a:t>
+            </a:r>
+            <a:r>
+              <a:rPr lang="fr-SN" sz="2400" dirty="0">
+                <a:latin typeface="Times New Roman" panose="02020603050405020304" pitchFamily="18" charset="0"/>
+                <a:cs typeface="Times New Roman" panose="02020603050405020304" pitchFamily="18" charset="0"/>
+              </a:rPr>
+              <a:t>, </a:t>
+            </a:r>
+            <a:r>
+              <a:rPr lang="fr-SN" sz="2400" dirty="0" err="1">
+                <a:latin typeface="Times New Roman" panose="02020603050405020304" pitchFamily="18" charset="0"/>
+                <a:cs typeface="Times New Roman" panose="02020603050405020304" pitchFamily="18" charset="0"/>
+              </a:rPr>
+              <a:t>OrderDate</a:t>
+            </a:r>
+            <a:r>
+              <a:rPr lang="fr-SN" sz="2400" dirty="0">
+                <a:latin typeface="Times New Roman" panose="02020603050405020304" pitchFamily="18" charset="0"/>
+                <a:cs typeface="Times New Roman" panose="02020603050405020304" pitchFamily="18" charset="0"/>
+              </a:rPr>
+              <a:t>, </a:t>
+            </a:r>
+            <a:r>
+              <a:rPr lang="fr-SN" sz="2400" dirty="0" err="1">
+                <a:latin typeface="Times New Roman" panose="02020603050405020304" pitchFamily="18" charset="0"/>
+                <a:cs typeface="Times New Roman" panose="02020603050405020304" pitchFamily="18" charset="0"/>
+              </a:rPr>
+              <a:t>HeadquarterID</a:t>
+            </a:r>
+            <a:r>
+              <a:rPr lang="fr-SN" sz="2400" dirty="0">
+                <a:latin typeface="Times New Roman" panose="02020603050405020304" pitchFamily="18" charset="0"/>
+                <a:cs typeface="Times New Roman" panose="02020603050405020304" pitchFamily="18" charset="0"/>
+              </a:rPr>
+              <a:t>, </a:t>
+            </a:r>
+            <a:r>
+              <a:rPr lang="fr-SN" sz="2400" dirty="0" err="1">
+                <a:latin typeface="Times New Roman" panose="02020603050405020304" pitchFamily="18" charset="0"/>
+                <a:cs typeface="Times New Roman" panose="02020603050405020304" pitchFamily="18" charset="0"/>
+              </a:rPr>
+              <a:t>ProductId</a:t>
+            </a:r>
+            <a:r>
+              <a:rPr lang="fr-SN" sz="2400" dirty="0">
+                <a:latin typeface="Times New Roman" panose="02020603050405020304" pitchFamily="18" charset="0"/>
+                <a:cs typeface="Times New Roman" panose="02020603050405020304" pitchFamily="18" charset="0"/>
+              </a:rPr>
+              <a:t>, </a:t>
+            </a:r>
+            <a:r>
+              <a:rPr lang="fr-SN" sz="2400" dirty="0" err="1">
+                <a:latin typeface="Times New Roman" panose="02020603050405020304" pitchFamily="18" charset="0"/>
+                <a:cs typeface="Times New Roman" panose="02020603050405020304" pitchFamily="18" charset="0"/>
+              </a:rPr>
+              <a:t>ProductQuantity</a:t>
+            </a:r>
+            <a:r>
+              <a:rPr lang="fr-SN" sz="2400" dirty="0">
+                <a:latin typeface="Times New Roman" panose="02020603050405020304" pitchFamily="18" charset="0"/>
+                <a:cs typeface="Times New Roman" panose="02020603050405020304" pitchFamily="18" charset="0"/>
+              </a:rPr>
+              <a:t>)</a:t>
+            </a:r>
           </a:p>
           <a:p>
             <a:r>
@@ -3463,49 +3599,7 @@
                 <a:latin typeface="Times New Roman" panose="02020603050405020304" pitchFamily="18" charset="0"/>
                 <a:cs typeface="Times New Roman" panose="02020603050405020304" pitchFamily="18" charset="0"/>
               </a:rPr>
-              <a:t>OrderDetailId</a:t>
-            </a:r>
-            <a:r>
-              <a:rPr lang="fr-SN" sz="2400" dirty="0">
-                <a:latin typeface="Times New Roman" panose="02020603050405020304" pitchFamily="18" charset="0"/>
-                <a:cs typeface="Times New Roman" panose="02020603050405020304" pitchFamily="18" charset="0"/>
-              </a:rPr>
-              <a:t>, </a:t>
-            </a:r>
-            <a:r>
-              <a:rPr lang="fr-SN" sz="2400" dirty="0" err="1">
-                <a:latin typeface="Times New Roman" panose="02020603050405020304" pitchFamily="18" charset="0"/>
-                <a:cs typeface="Times New Roman" panose="02020603050405020304" pitchFamily="18" charset="0"/>
-              </a:rPr>
-              <a:t>ProductId</a:t>
-            </a:r>
-            <a:r>
-              <a:rPr lang="fr-SN" sz="2400" dirty="0">
-                <a:latin typeface="Times New Roman" panose="02020603050405020304" pitchFamily="18" charset="0"/>
-                <a:cs typeface="Times New Roman" panose="02020603050405020304" pitchFamily="18" charset="0"/>
-              </a:rPr>
-              <a:t>, </a:t>
-            </a:r>
-            <a:r>
-              <a:rPr lang="fr-SN" sz="2400" dirty="0" err="1">
-                <a:latin typeface="Times New Roman" panose="02020603050405020304" pitchFamily="18" charset="0"/>
-                <a:cs typeface="Times New Roman" panose="02020603050405020304" pitchFamily="18" charset="0"/>
-              </a:rPr>
-              <a:t>OrderId</a:t>
-            </a:r>
-            <a:r>
-              <a:rPr lang="fr-SN" sz="2400" dirty="0">
-                <a:latin typeface="Times New Roman" panose="02020603050405020304" pitchFamily="18" charset="0"/>
-                <a:cs typeface="Times New Roman" panose="02020603050405020304" pitchFamily="18" charset="0"/>
-              </a:rPr>
-              <a:t>, </a:t>
-            </a:r>
-            <a:r>
-              <a:rPr lang="fr-SN" sz="2400" dirty="0" err="1">
-                <a:latin typeface="Times New Roman" panose="02020603050405020304" pitchFamily="18" charset="0"/>
-                <a:cs typeface="Times New Roman" panose="02020603050405020304" pitchFamily="18" charset="0"/>
-              </a:rPr>
-              <a:t>ProductQuantity</a:t>
+              <a:t>OrderDetailID</a:t>
             </a:r>
             <a:r>
               <a:rPr lang="fr-SN" sz="2400" dirty="0">
@@ -3517,166 +3611,6 @@
           </a:p>
           <a:p>
             <a:r>
-              <a:rPr lang="fr-SN" sz="2400" b="1" dirty="0">
-                <a:latin typeface="Times New Roman" panose="02020603050405020304" pitchFamily="18" charset="0"/>
-                <a:cs typeface="Times New Roman" panose="02020603050405020304" pitchFamily="18" charset="0"/>
-              </a:rPr>
-              <a:t>Product</a:t>
-            </a:r>
-            <a:r>
-              <a:rPr lang="fr-SN" sz="2400" dirty="0">
-                <a:latin typeface="Times New Roman" panose="02020603050405020304" pitchFamily="18" charset="0"/>
-                <a:cs typeface="Times New Roman" panose="02020603050405020304" pitchFamily="18" charset="0"/>
-              </a:rPr>
-              <a:t>(</a:t>
-            </a:r>
-            <a:r>
-              <a:rPr lang="fr-SN" sz="2400" dirty="0" err="1">
-                <a:latin typeface="Times New Roman" panose="02020603050405020304" pitchFamily="18" charset="0"/>
-                <a:cs typeface="Times New Roman" panose="02020603050405020304" pitchFamily="18" charset="0"/>
-              </a:rPr>
-              <a:t>SupplierId</a:t>
-            </a:r>
-            <a:r>
-              <a:rPr lang="fr-SN" sz="2400" dirty="0">
-                <a:latin typeface="Times New Roman" panose="02020603050405020304" pitchFamily="18" charset="0"/>
-                <a:cs typeface="Times New Roman" panose="02020603050405020304" pitchFamily="18" charset="0"/>
-              </a:rPr>
-              <a:t>, </a:t>
-            </a:r>
-            <a:r>
-              <a:rPr lang="fr-SN" sz="2400" dirty="0" err="1">
-                <a:latin typeface="Times New Roman" panose="02020603050405020304" pitchFamily="18" charset="0"/>
-                <a:cs typeface="Times New Roman" panose="02020603050405020304" pitchFamily="18" charset="0"/>
-              </a:rPr>
-              <a:t>ProductId</a:t>
-            </a:r>
-            <a:r>
-              <a:rPr lang="fr-SN" sz="2400" dirty="0">
-                <a:latin typeface="Times New Roman" panose="02020603050405020304" pitchFamily="18" charset="0"/>
-                <a:cs typeface="Times New Roman" panose="02020603050405020304" pitchFamily="18" charset="0"/>
-              </a:rPr>
-              <a:t>)</a:t>
-            </a:r>
-          </a:p>
-          <a:p>
-            <a:r>
-              <a:rPr lang="fr-SN" sz="2400" b="1" dirty="0">
-                <a:latin typeface="Times New Roman" panose="02020603050405020304" pitchFamily="18" charset="0"/>
-                <a:cs typeface="Times New Roman" panose="02020603050405020304" pitchFamily="18" charset="0"/>
-              </a:rPr>
-              <a:t>Supplier</a:t>
-            </a:r>
-            <a:r>
-              <a:rPr lang="fr-SN" sz="2400" dirty="0">
-                <a:latin typeface="Times New Roman" panose="02020603050405020304" pitchFamily="18" charset="0"/>
-                <a:cs typeface="Times New Roman" panose="02020603050405020304" pitchFamily="18" charset="0"/>
-              </a:rPr>
-              <a:t>(</a:t>
-            </a:r>
-            <a:r>
-              <a:rPr lang="fr-SN" sz="2400" dirty="0" err="1">
-                <a:latin typeface="Times New Roman" panose="02020603050405020304" pitchFamily="18" charset="0"/>
-                <a:cs typeface="Times New Roman" panose="02020603050405020304" pitchFamily="18" charset="0"/>
-              </a:rPr>
-              <a:t>DeliveryId</a:t>
-            </a:r>
-            <a:r>
-              <a:rPr lang="fr-SN" sz="2400" dirty="0">
-                <a:latin typeface="Times New Roman" panose="02020603050405020304" pitchFamily="18" charset="0"/>
-                <a:cs typeface="Times New Roman" panose="02020603050405020304" pitchFamily="18" charset="0"/>
-              </a:rPr>
-              <a:t>, </a:t>
-            </a:r>
-            <a:r>
-              <a:rPr lang="fr-SN" sz="2400" dirty="0" err="1">
-                <a:latin typeface="Times New Roman" panose="02020603050405020304" pitchFamily="18" charset="0"/>
-                <a:cs typeface="Times New Roman" panose="02020603050405020304" pitchFamily="18" charset="0"/>
-              </a:rPr>
-              <a:t>DeliveryDate</a:t>
-            </a:r>
-            <a:r>
-              <a:rPr lang="fr-SN" sz="2400" dirty="0">
-                <a:latin typeface="Times New Roman" panose="02020603050405020304" pitchFamily="18" charset="0"/>
-                <a:cs typeface="Times New Roman" panose="02020603050405020304" pitchFamily="18" charset="0"/>
-              </a:rPr>
-              <a:t>, </a:t>
-            </a:r>
-            <a:r>
-              <a:rPr lang="fr-SN" sz="2400" dirty="0" err="1">
-                <a:latin typeface="Times New Roman" panose="02020603050405020304" pitchFamily="18" charset="0"/>
-                <a:cs typeface="Times New Roman" panose="02020603050405020304" pitchFamily="18" charset="0"/>
-              </a:rPr>
-              <a:t>SupplierId</a:t>
-            </a:r>
-            <a:r>
-              <a:rPr lang="fr-SN" sz="2400" dirty="0">
-                <a:latin typeface="Times New Roman" panose="02020603050405020304" pitchFamily="18" charset="0"/>
-                <a:cs typeface="Times New Roman" panose="02020603050405020304" pitchFamily="18" charset="0"/>
-              </a:rPr>
-              <a:t>)</a:t>
-            </a:r>
-          </a:p>
-          <a:p>
-            <a:r>
-              <a:rPr lang="fr-SN" sz="2400" b="1" dirty="0" err="1">
-                <a:latin typeface="Times New Roman" panose="02020603050405020304" pitchFamily="18" charset="0"/>
-                <a:cs typeface="Times New Roman" panose="02020603050405020304" pitchFamily="18" charset="0"/>
-              </a:rPr>
-              <a:t>Order</a:t>
-            </a:r>
-            <a:r>
-              <a:rPr lang="fr-SN" sz="2400" dirty="0">
-                <a:latin typeface="Times New Roman" panose="02020603050405020304" pitchFamily="18" charset="0"/>
-                <a:cs typeface="Times New Roman" panose="02020603050405020304" pitchFamily="18" charset="0"/>
-              </a:rPr>
-              <a:t>(</a:t>
-            </a:r>
-            <a:r>
-              <a:rPr lang="fr-SN" sz="2400" dirty="0" err="1">
-                <a:latin typeface="Times New Roman" panose="02020603050405020304" pitchFamily="18" charset="0"/>
-                <a:cs typeface="Times New Roman" panose="02020603050405020304" pitchFamily="18" charset="0"/>
-              </a:rPr>
-              <a:t>OrderId</a:t>
-            </a:r>
-            <a:r>
-              <a:rPr lang="fr-SN" sz="2400" dirty="0">
-                <a:latin typeface="Times New Roman" panose="02020603050405020304" pitchFamily="18" charset="0"/>
-                <a:cs typeface="Times New Roman" panose="02020603050405020304" pitchFamily="18" charset="0"/>
-              </a:rPr>
-              <a:t>, </a:t>
-            </a:r>
-            <a:r>
-              <a:rPr lang="fr-SN" sz="2400" dirty="0" err="1">
-                <a:latin typeface="Times New Roman" panose="02020603050405020304" pitchFamily="18" charset="0"/>
-                <a:cs typeface="Times New Roman" panose="02020603050405020304" pitchFamily="18" charset="0"/>
-              </a:rPr>
-              <a:t>OrderDate</a:t>
-            </a:r>
-            <a:r>
-              <a:rPr lang="fr-SN" sz="2400" dirty="0">
-                <a:latin typeface="Times New Roman" panose="02020603050405020304" pitchFamily="18" charset="0"/>
-                <a:cs typeface="Times New Roman" panose="02020603050405020304" pitchFamily="18" charset="0"/>
-              </a:rPr>
-              <a:t>, </a:t>
-            </a:r>
-            <a:r>
-              <a:rPr lang="fr-SN" sz="2400" dirty="0" err="1">
-                <a:latin typeface="Times New Roman" panose="02020603050405020304" pitchFamily="18" charset="0"/>
-                <a:cs typeface="Times New Roman" panose="02020603050405020304" pitchFamily="18" charset="0"/>
-              </a:rPr>
-              <a:t>HeadquarterId</a:t>
-            </a:r>
-            <a:r>
-              <a:rPr lang="fr-SN" sz="2400" dirty="0">
-                <a:latin typeface="Times New Roman" panose="02020603050405020304" pitchFamily="18" charset="0"/>
-                <a:cs typeface="Times New Roman" panose="02020603050405020304" pitchFamily="18" charset="0"/>
-              </a:rPr>
-              <a:t>)</a:t>
-            </a:r>
-          </a:p>
-          <a:p>
-            <a:r>
               <a:rPr lang="fr-SN" sz="2400" b="1" dirty="0" err="1">
                 <a:latin typeface="Times New Roman" panose="02020603050405020304" pitchFamily="18" charset="0"/>
                 <a:cs typeface="Times New Roman" panose="02020603050405020304" pitchFamily="18" charset="0"/>
@@ -3695,49 +3629,32 @@
       </p:sp>
       <p:pic>
         <p:nvPicPr>
-          <p:cNvPr id="1026" name="Picture 2">
-            <a:extLst>
-              <a:ext uri="{FF2B5EF4-FFF2-40B4-BE49-F238E27FC236}">
-                <a16:creationId xmlns:a16="http://schemas.microsoft.com/office/drawing/2014/main" id="{573217ED-635A-11F5-7A6E-A10FC8699749}"/>
+          <p:cNvPr id="6" name="Image 5">
+            <a:extLst>
+              <a:ext uri="{FF2B5EF4-FFF2-40B4-BE49-F238E27FC236}">
+                <a16:creationId xmlns:a16="http://schemas.microsoft.com/office/drawing/2014/main" id="{12C617F3-4264-0EF9-C6B9-223CD838D62E}"/>
               </a:ext>
             </a:extLst>
           </p:cNvPr>
           <p:cNvPicPr>
-            <a:picLocks noChangeAspect="1" noChangeArrowheads="1"/>
+            <a:picLocks noChangeAspect="1"/>
           </p:cNvPicPr>
           <p:nvPr/>
         </p:nvPicPr>
         <p:blipFill>
-          <a:blip r:embed="rId2">
-            <a:extLst>
-              <a:ext uri="{28A0092B-C50C-407E-A947-70E740481C1C}">
-                <a14:useLocalDpi xmlns:a14="http://schemas.microsoft.com/office/drawing/2010/main" val="0"/>
-              </a:ext>
-            </a:extLst>
-          </a:blip>
-          <a:srcRect/>
+          <a:blip r:embed="rId2"/>
           <a:stretch>
             <a:fillRect/>
           </a:stretch>
         </p:blipFill>
-        <p:spPr bwMode="auto">
+        <p:spPr>
           <a:xfrm>
-            <a:off x="1340434" y="128741"/>
-            <a:ext cx="9573372" cy="3750085"/>
+            <a:off x="1683159" y="141646"/>
+            <a:ext cx="8825681" cy="3621649"/>
           </a:xfrm>
           <a:prstGeom prst="rect">
             <a:avLst/>
           </a:prstGeom>
-          <a:noFill/>
-          <a:extLst>
-            <a:ext uri="{909E8E84-426E-40DD-AFC4-6F175D3DCCD1}">
-              <a14:hiddenFill xmlns:a14="http://schemas.microsoft.com/office/drawing/2010/main">
-                <a:solidFill>
-                  <a:srgbClr val="FFFFFF"/>
-                </a:solidFill>
-              </a14:hiddenFill>
-            </a:ext>
-          </a:extLst>
         </p:spPr>
       </p:pic>
     </p:spTree>

</xml_diff>